<commit_message>
Change BEE_Private in some areas and use hpc-beeflow for version number
</commit_message>
<xml_diff>
--- a/docs/sphinx/images/src/clamr-step.pptx
+++ b/docs/sphinx/images/src/clamr-step.pptx
@@ -259,7 +259,7 @@
           <a:p>
             <a:fld id="{1762FBE5-467A-1447-87EC-23FD46633CC3}" type="datetimeFigureOut">
               <a:rPr lang="en-US" smtClean="0"/>
-              <a:t>8/15/22</a:t>
+              <a:t>8/24/22</a:t>
             </a:fld>
             <a:endParaRPr lang="en-US"/>
           </a:p>
@@ -457,7 +457,7 @@
           <a:p>
             <a:fld id="{1762FBE5-467A-1447-87EC-23FD46633CC3}" type="datetimeFigureOut">
               <a:rPr lang="en-US" smtClean="0"/>
-              <a:t>8/15/22</a:t>
+              <a:t>8/24/22</a:t>
             </a:fld>
             <a:endParaRPr lang="en-US"/>
           </a:p>
@@ -665,7 +665,7 @@
           <a:p>
             <a:fld id="{1762FBE5-467A-1447-87EC-23FD46633CC3}" type="datetimeFigureOut">
               <a:rPr lang="en-US" smtClean="0"/>
-              <a:t>8/15/22</a:t>
+              <a:t>8/24/22</a:t>
             </a:fld>
             <a:endParaRPr lang="en-US"/>
           </a:p>
@@ -863,7 +863,7 @@
           <a:p>
             <a:fld id="{1762FBE5-467A-1447-87EC-23FD46633CC3}" type="datetimeFigureOut">
               <a:rPr lang="en-US" smtClean="0"/>
-              <a:t>8/15/22</a:t>
+              <a:t>8/24/22</a:t>
             </a:fld>
             <a:endParaRPr lang="en-US"/>
           </a:p>
@@ -1138,7 +1138,7 @@
           <a:p>
             <a:fld id="{1762FBE5-467A-1447-87EC-23FD46633CC3}" type="datetimeFigureOut">
               <a:rPr lang="en-US" smtClean="0"/>
-              <a:t>8/15/22</a:t>
+              <a:t>8/24/22</a:t>
             </a:fld>
             <a:endParaRPr lang="en-US"/>
           </a:p>
@@ -1403,7 +1403,7 @@
           <a:p>
             <a:fld id="{1762FBE5-467A-1447-87EC-23FD46633CC3}" type="datetimeFigureOut">
               <a:rPr lang="en-US" smtClean="0"/>
-              <a:t>8/15/22</a:t>
+              <a:t>8/24/22</a:t>
             </a:fld>
             <a:endParaRPr lang="en-US"/>
           </a:p>
@@ -1815,7 +1815,7 @@
           <a:p>
             <a:fld id="{1762FBE5-467A-1447-87EC-23FD46633CC3}" type="datetimeFigureOut">
               <a:rPr lang="en-US" smtClean="0"/>
-              <a:t>8/15/22</a:t>
+              <a:t>8/24/22</a:t>
             </a:fld>
             <a:endParaRPr lang="en-US"/>
           </a:p>
@@ -1956,7 +1956,7 @@
           <a:p>
             <a:fld id="{1762FBE5-467A-1447-87EC-23FD46633CC3}" type="datetimeFigureOut">
               <a:rPr lang="en-US" smtClean="0"/>
-              <a:t>8/15/22</a:t>
+              <a:t>8/24/22</a:t>
             </a:fld>
             <a:endParaRPr lang="en-US"/>
           </a:p>
@@ -2069,7 +2069,7 @@
           <a:p>
             <a:fld id="{1762FBE5-467A-1447-87EC-23FD46633CC3}" type="datetimeFigureOut">
               <a:rPr lang="en-US" smtClean="0"/>
-              <a:t>8/15/22</a:t>
+              <a:t>8/24/22</a:t>
             </a:fld>
             <a:endParaRPr lang="en-US"/>
           </a:p>
@@ -2380,7 +2380,7 @@
           <a:p>
             <a:fld id="{1762FBE5-467A-1447-87EC-23FD46633CC3}" type="datetimeFigureOut">
               <a:rPr lang="en-US" smtClean="0"/>
-              <a:t>8/15/22</a:t>
+              <a:t>8/24/22</a:t>
             </a:fld>
             <a:endParaRPr lang="en-US"/>
           </a:p>
@@ -2668,7 +2668,7 @@
           <a:p>
             <a:fld id="{1762FBE5-467A-1447-87EC-23FD46633CC3}" type="datetimeFigureOut">
               <a:rPr lang="en-US" smtClean="0"/>
-              <a:t>8/15/22</a:t>
+              <a:t>8/24/22</a:t>
             </a:fld>
             <a:endParaRPr lang="en-US"/>
           </a:p>
@@ -2909,7 +2909,7 @@
           <a:p>
             <a:fld id="{1762FBE5-467A-1447-87EC-23FD46633CC3}" type="datetimeFigureOut">
               <a:rPr lang="en-US" smtClean="0"/>
-              <a:t>8/15/22</a:t>
+              <a:t>8/24/22</a:t>
             </a:fld>
             <a:endParaRPr lang="en-US"/>
           </a:p>
@@ -3328,10 +3328,10 @@
       </p:grpSpPr>
       <p:pic>
         <p:nvPicPr>
-          <p:cNvPr id="2" name="Picture 1">
-            <a:extLst>
-              <a:ext uri="{FF2B5EF4-FFF2-40B4-BE49-F238E27FC236}">
-                <a16:creationId xmlns:a16="http://schemas.microsoft.com/office/drawing/2014/main" id="{99614A7B-0D51-4374-853E-64CE35E50C65}"/>
+          <p:cNvPr id="3" name="Picture 2">
+            <a:extLst>
+              <a:ext uri="{FF2B5EF4-FFF2-40B4-BE49-F238E27FC236}">
+                <a16:creationId xmlns:a16="http://schemas.microsoft.com/office/drawing/2014/main" id="{094A439A-DFC8-F38B-2A66-620BF394FCEB}"/>
               </a:ext>
             </a:extLst>
           </p:cNvPr>
@@ -3348,8 +3348,8 @@
         </p:blipFill>
         <p:spPr>
           <a:xfrm>
-            <a:off x="1957521" y="1213952"/>
-            <a:ext cx="8515785" cy="3390901"/>
+            <a:off x="2129411" y="1285736"/>
+            <a:ext cx="8343895" cy="3319118"/>
           </a:xfrm>
           <a:prstGeom prst="rect">
             <a:avLst/>

</xml_diff>

<commit_message>
Modify image for new location of dockerfile
</commit_message>
<xml_diff>
--- a/docs/sphinx/images/src/clamr-step.pptx
+++ b/docs/sphinx/images/src/clamr-step.pptx
@@ -259,7 +259,7 @@
           <a:p>
             <a:fld id="{1762FBE5-467A-1447-87EC-23FD46633CC3}" type="datetimeFigureOut">
               <a:rPr lang="en-US" smtClean="0"/>
-              <a:t>8/24/22</a:t>
+              <a:t>10/6/22</a:t>
             </a:fld>
             <a:endParaRPr lang="en-US"/>
           </a:p>
@@ -457,7 +457,7 @@
           <a:p>
             <a:fld id="{1762FBE5-467A-1447-87EC-23FD46633CC3}" type="datetimeFigureOut">
               <a:rPr lang="en-US" smtClean="0"/>
-              <a:t>8/24/22</a:t>
+              <a:t>10/6/22</a:t>
             </a:fld>
             <a:endParaRPr lang="en-US"/>
           </a:p>
@@ -665,7 +665,7 @@
           <a:p>
             <a:fld id="{1762FBE5-467A-1447-87EC-23FD46633CC3}" type="datetimeFigureOut">
               <a:rPr lang="en-US" smtClean="0"/>
-              <a:t>8/24/22</a:t>
+              <a:t>10/6/22</a:t>
             </a:fld>
             <a:endParaRPr lang="en-US"/>
           </a:p>
@@ -863,7 +863,7 @@
           <a:p>
             <a:fld id="{1762FBE5-467A-1447-87EC-23FD46633CC3}" type="datetimeFigureOut">
               <a:rPr lang="en-US" smtClean="0"/>
-              <a:t>8/24/22</a:t>
+              <a:t>10/6/22</a:t>
             </a:fld>
             <a:endParaRPr lang="en-US"/>
           </a:p>
@@ -1138,7 +1138,7 @@
           <a:p>
             <a:fld id="{1762FBE5-467A-1447-87EC-23FD46633CC3}" type="datetimeFigureOut">
               <a:rPr lang="en-US" smtClean="0"/>
-              <a:t>8/24/22</a:t>
+              <a:t>10/6/22</a:t>
             </a:fld>
             <a:endParaRPr lang="en-US"/>
           </a:p>
@@ -1403,7 +1403,7 @@
           <a:p>
             <a:fld id="{1762FBE5-467A-1447-87EC-23FD46633CC3}" type="datetimeFigureOut">
               <a:rPr lang="en-US" smtClean="0"/>
-              <a:t>8/24/22</a:t>
+              <a:t>10/6/22</a:t>
             </a:fld>
             <a:endParaRPr lang="en-US"/>
           </a:p>
@@ -1815,7 +1815,7 @@
           <a:p>
             <a:fld id="{1762FBE5-467A-1447-87EC-23FD46633CC3}" type="datetimeFigureOut">
               <a:rPr lang="en-US" smtClean="0"/>
-              <a:t>8/24/22</a:t>
+              <a:t>10/6/22</a:t>
             </a:fld>
             <a:endParaRPr lang="en-US"/>
           </a:p>
@@ -1956,7 +1956,7 @@
           <a:p>
             <a:fld id="{1762FBE5-467A-1447-87EC-23FD46633CC3}" type="datetimeFigureOut">
               <a:rPr lang="en-US" smtClean="0"/>
-              <a:t>8/24/22</a:t>
+              <a:t>10/6/22</a:t>
             </a:fld>
             <a:endParaRPr lang="en-US"/>
           </a:p>
@@ -2069,7 +2069,7 @@
           <a:p>
             <a:fld id="{1762FBE5-467A-1447-87EC-23FD46633CC3}" type="datetimeFigureOut">
               <a:rPr lang="en-US" smtClean="0"/>
-              <a:t>8/24/22</a:t>
+              <a:t>10/6/22</a:t>
             </a:fld>
             <a:endParaRPr lang="en-US"/>
           </a:p>
@@ -2380,7 +2380,7 @@
           <a:p>
             <a:fld id="{1762FBE5-467A-1447-87EC-23FD46633CC3}" type="datetimeFigureOut">
               <a:rPr lang="en-US" smtClean="0"/>
-              <a:t>8/24/22</a:t>
+              <a:t>10/6/22</a:t>
             </a:fld>
             <a:endParaRPr lang="en-US"/>
           </a:p>
@@ -2668,7 +2668,7 @@
           <a:p>
             <a:fld id="{1762FBE5-467A-1447-87EC-23FD46633CC3}" type="datetimeFigureOut">
               <a:rPr lang="en-US" smtClean="0"/>
-              <a:t>8/24/22</a:t>
+              <a:t>10/6/22</a:t>
             </a:fld>
             <a:endParaRPr lang="en-US"/>
           </a:p>
@@ -2909,7 +2909,7 @@
           <a:p>
             <a:fld id="{1762FBE5-467A-1447-87EC-23FD46633CC3}" type="datetimeFigureOut">
               <a:rPr lang="en-US" smtClean="0"/>
-              <a:t>8/24/22</a:t>
+              <a:t>10/6/22</a:t>
             </a:fld>
             <a:endParaRPr lang="en-US"/>
           </a:p>
@@ -3326,36 +3326,6 @@
           <a:chExt cx="0" cy="0"/>
         </a:xfrm>
       </p:grpSpPr>
-      <p:pic>
-        <p:nvPicPr>
-          <p:cNvPr id="3" name="Picture 2">
-            <a:extLst>
-              <a:ext uri="{FF2B5EF4-FFF2-40B4-BE49-F238E27FC236}">
-                <a16:creationId xmlns:a16="http://schemas.microsoft.com/office/drawing/2014/main" id="{094A439A-DFC8-F38B-2A66-620BF394FCEB}"/>
-              </a:ext>
-            </a:extLst>
-          </p:cNvPr>
-          <p:cNvPicPr>
-            <a:picLocks noChangeAspect="1"/>
-          </p:cNvPicPr>
-          <p:nvPr/>
-        </p:nvPicPr>
-        <p:blipFill>
-          <a:blip r:embed="rId2"/>
-          <a:stretch>
-            <a:fillRect/>
-          </a:stretch>
-        </p:blipFill>
-        <p:spPr>
-          <a:xfrm>
-            <a:off x="2129411" y="1285736"/>
-            <a:ext cx="8343895" cy="3319118"/>
-          </a:xfrm>
-          <a:prstGeom prst="rect">
-            <a:avLst/>
-          </a:prstGeom>
-        </p:spPr>
-      </p:pic>
       <p:sp>
         <p:nvSpPr>
           <p:cNvPr id="8" name="Double Brace 7">
@@ -3624,6 +3594,643 @@
                   </a:srgbClr>
                 </a:outerShdw>
               </a:effectLst>
+            </a:endParaRPr>
+          </a:p>
+        </p:txBody>
+      </p:sp>
+      <p:sp>
+        <p:nvSpPr>
+          <p:cNvPr id="5" name="TextBox 4">
+            <a:extLst>
+              <a:ext uri="{FF2B5EF4-FFF2-40B4-BE49-F238E27FC236}">
+                <a16:creationId xmlns:a16="http://schemas.microsoft.com/office/drawing/2014/main" id="{945B7854-5864-77DE-804A-AEE7A36B0666}"/>
+              </a:ext>
+            </a:extLst>
+          </p:cNvPr>
+          <p:cNvSpPr txBox="1"/>
+          <p:nvPr/>
+        </p:nvSpPr>
+        <p:spPr>
+          <a:xfrm>
+            <a:off x="2002055" y="1237151"/>
+            <a:ext cx="8857850" cy="3539430"/>
+          </a:xfrm>
+          <a:prstGeom prst="rect">
+            <a:avLst/>
+          </a:prstGeom>
+          <a:noFill/>
+        </p:spPr>
+        <p:txBody>
+          <a:bodyPr wrap="square" rtlCol="0">
+            <a:spAutoFit/>
+          </a:bodyPr>
+          <a:lstStyle/>
+          <a:p>
+            <a:r>
+              <a:rPr lang="en-US" sz="1400" dirty="0">
+                <a:solidFill>
+                  <a:srgbClr val="000000"/>
+                </a:solidFill>
+                <a:effectLst/>
+                <a:latin typeface="Menlo" panose="020B0609030804020204" pitchFamily="49" charset="0"/>
+              </a:rPr>
+              <a:t>steps:</a:t>
+            </a:r>
+          </a:p>
+          <a:p>
+            <a:r>
+              <a:rPr lang="en-US" sz="1400" dirty="0">
+                <a:solidFill>
+                  <a:srgbClr val="000000"/>
+                </a:solidFill>
+                <a:effectLst/>
+                <a:latin typeface="Menlo" panose="020B0609030804020204" pitchFamily="49" charset="0"/>
+              </a:rPr>
+              <a:t>  </a:t>
+            </a:r>
+            <a:r>
+              <a:rPr lang="en-US" sz="1400" dirty="0" err="1">
+                <a:solidFill>
+                  <a:srgbClr val="000000"/>
+                </a:solidFill>
+                <a:effectLst/>
+                <a:latin typeface="Menlo" panose="020B0609030804020204" pitchFamily="49" charset="0"/>
+              </a:rPr>
+              <a:t>clamr</a:t>
+            </a:r>
+            <a:r>
+              <a:rPr lang="en-US" sz="1400" dirty="0">
+                <a:solidFill>
+                  <a:srgbClr val="000000"/>
+                </a:solidFill>
+                <a:effectLst/>
+                <a:latin typeface="Menlo" panose="020B0609030804020204" pitchFamily="49" charset="0"/>
+              </a:rPr>
+              <a:t>:</a:t>
+            </a:r>
+          </a:p>
+          <a:p>
+            <a:r>
+              <a:rPr lang="en-US" sz="1400" dirty="0">
+                <a:solidFill>
+                  <a:srgbClr val="000000"/>
+                </a:solidFill>
+                <a:effectLst/>
+                <a:latin typeface="Menlo" panose="020B0609030804020204" pitchFamily="49" charset="0"/>
+              </a:rPr>
+              <a:t>    run: </a:t>
+            </a:r>
+            <a:r>
+              <a:rPr lang="en-US" sz="1400" dirty="0" err="1">
+                <a:solidFill>
+                  <a:srgbClr val="000000"/>
+                </a:solidFill>
+                <a:effectLst/>
+                <a:latin typeface="Menlo" panose="020B0609030804020204" pitchFamily="49" charset="0"/>
+              </a:rPr>
+              <a:t>clamr.cwl</a:t>
+            </a:r>
+            <a:endParaRPr lang="en-US" sz="1400" dirty="0">
+              <a:solidFill>
+                <a:srgbClr val="000000"/>
+              </a:solidFill>
+              <a:effectLst/>
+              <a:latin typeface="Menlo" panose="020B0609030804020204" pitchFamily="49" charset="0"/>
+            </a:endParaRPr>
+          </a:p>
+          <a:p>
+            <a:r>
+              <a:rPr lang="en-US" sz="1400" dirty="0">
+                <a:solidFill>
+                  <a:srgbClr val="000000"/>
+                </a:solidFill>
+                <a:effectLst/>
+                <a:latin typeface="Menlo" panose="020B0609030804020204" pitchFamily="49" charset="0"/>
+              </a:rPr>
+              <a:t>    in:</a:t>
+            </a:r>
+          </a:p>
+          <a:p>
+            <a:r>
+              <a:rPr lang="en-US" sz="1400" dirty="0">
+                <a:solidFill>
+                  <a:srgbClr val="000000"/>
+                </a:solidFill>
+                <a:effectLst/>
+                <a:latin typeface="Menlo" panose="020B0609030804020204" pitchFamily="49" charset="0"/>
+              </a:rPr>
+              <a:t>      </a:t>
+            </a:r>
+            <a:r>
+              <a:rPr lang="en-US" sz="1400" dirty="0" err="1">
+                <a:solidFill>
+                  <a:srgbClr val="000000"/>
+                </a:solidFill>
+                <a:effectLst/>
+                <a:latin typeface="Menlo" panose="020B0609030804020204" pitchFamily="49" charset="0"/>
+              </a:rPr>
+              <a:t>grid_res</a:t>
+            </a:r>
+            <a:r>
+              <a:rPr lang="en-US" sz="1400" dirty="0">
+                <a:solidFill>
+                  <a:srgbClr val="000000"/>
+                </a:solidFill>
+                <a:effectLst/>
+                <a:latin typeface="Menlo" panose="020B0609030804020204" pitchFamily="49" charset="0"/>
+              </a:rPr>
+              <a:t>: </a:t>
+            </a:r>
+            <a:r>
+              <a:rPr lang="en-US" sz="1400" dirty="0" err="1">
+                <a:solidFill>
+                  <a:srgbClr val="000000"/>
+                </a:solidFill>
+                <a:effectLst/>
+                <a:latin typeface="Menlo" panose="020B0609030804020204" pitchFamily="49" charset="0"/>
+              </a:rPr>
+              <a:t>grid_resolution</a:t>
+            </a:r>
+            <a:endParaRPr lang="en-US" sz="1400" dirty="0">
+              <a:solidFill>
+                <a:srgbClr val="000000"/>
+              </a:solidFill>
+              <a:effectLst/>
+              <a:latin typeface="Menlo" panose="020B0609030804020204" pitchFamily="49" charset="0"/>
+            </a:endParaRPr>
+          </a:p>
+          <a:p>
+            <a:r>
+              <a:rPr lang="en-US" sz="1400" dirty="0">
+                <a:solidFill>
+                  <a:srgbClr val="000000"/>
+                </a:solidFill>
+                <a:effectLst/>
+                <a:latin typeface="Menlo" panose="020B0609030804020204" pitchFamily="49" charset="0"/>
+              </a:rPr>
+              <a:t>      </a:t>
+            </a:r>
+            <a:r>
+              <a:rPr lang="en-US" sz="1400" dirty="0" err="1">
+                <a:solidFill>
+                  <a:srgbClr val="000000"/>
+                </a:solidFill>
+                <a:effectLst/>
+                <a:latin typeface="Menlo" panose="020B0609030804020204" pitchFamily="49" charset="0"/>
+              </a:rPr>
+              <a:t>max_levels</a:t>
+            </a:r>
+            <a:r>
+              <a:rPr lang="en-US" sz="1400" dirty="0">
+                <a:solidFill>
+                  <a:srgbClr val="000000"/>
+                </a:solidFill>
+                <a:effectLst/>
+                <a:latin typeface="Menlo" panose="020B0609030804020204" pitchFamily="49" charset="0"/>
+              </a:rPr>
+              <a:t>: </a:t>
+            </a:r>
+            <a:r>
+              <a:rPr lang="en-US" sz="1400" dirty="0" err="1">
+                <a:solidFill>
+                  <a:srgbClr val="000000"/>
+                </a:solidFill>
+                <a:effectLst/>
+                <a:latin typeface="Menlo" panose="020B0609030804020204" pitchFamily="49" charset="0"/>
+              </a:rPr>
+              <a:t>max_levels</a:t>
+            </a:r>
+            <a:endParaRPr lang="en-US" sz="1400" dirty="0">
+              <a:solidFill>
+                <a:srgbClr val="000000"/>
+              </a:solidFill>
+              <a:effectLst/>
+              <a:latin typeface="Menlo" panose="020B0609030804020204" pitchFamily="49" charset="0"/>
+            </a:endParaRPr>
+          </a:p>
+          <a:p>
+            <a:r>
+              <a:rPr lang="en-US" sz="1400" dirty="0">
+                <a:solidFill>
+                  <a:srgbClr val="000000"/>
+                </a:solidFill>
+                <a:effectLst/>
+                <a:latin typeface="Menlo" panose="020B0609030804020204" pitchFamily="49" charset="0"/>
+              </a:rPr>
+              <a:t>      </a:t>
+            </a:r>
+            <a:r>
+              <a:rPr lang="en-US" sz="1400" dirty="0" err="1">
+                <a:solidFill>
+                  <a:srgbClr val="000000"/>
+                </a:solidFill>
+                <a:effectLst/>
+                <a:latin typeface="Menlo" panose="020B0609030804020204" pitchFamily="49" charset="0"/>
+              </a:rPr>
+              <a:t>time_steps</a:t>
+            </a:r>
+            <a:r>
+              <a:rPr lang="en-US" sz="1400" dirty="0">
+                <a:solidFill>
+                  <a:srgbClr val="000000"/>
+                </a:solidFill>
+                <a:effectLst/>
+                <a:latin typeface="Menlo" panose="020B0609030804020204" pitchFamily="49" charset="0"/>
+              </a:rPr>
+              <a:t>: </a:t>
+            </a:r>
+            <a:r>
+              <a:rPr lang="en-US" sz="1400" dirty="0" err="1">
+                <a:solidFill>
+                  <a:srgbClr val="000000"/>
+                </a:solidFill>
+                <a:effectLst/>
+                <a:latin typeface="Menlo" panose="020B0609030804020204" pitchFamily="49" charset="0"/>
+              </a:rPr>
+              <a:t>time_steps</a:t>
+            </a:r>
+            <a:endParaRPr lang="en-US" sz="1400" dirty="0">
+              <a:solidFill>
+                <a:srgbClr val="000000"/>
+              </a:solidFill>
+              <a:effectLst/>
+              <a:latin typeface="Menlo" panose="020B0609030804020204" pitchFamily="49" charset="0"/>
+            </a:endParaRPr>
+          </a:p>
+          <a:p>
+            <a:r>
+              <a:rPr lang="en-US" sz="1400" dirty="0">
+                <a:solidFill>
+                  <a:srgbClr val="000000"/>
+                </a:solidFill>
+                <a:effectLst/>
+                <a:latin typeface="Menlo" panose="020B0609030804020204" pitchFamily="49" charset="0"/>
+              </a:rPr>
+              <a:t>      </a:t>
+            </a:r>
+            <a:r>
+              <a:rPr lang="en-US" sz="1400" dirty="0" err="1">
+                <a:solidFill>
+                  <a:srgbClr val="000000"/>
+                </a:solidFill>
+                <a:effectLst/>
+                <a:latin typeface="Menlo" panose="020B0609030804020204" pitchFamily="49" charset="0"/>
+              </a:rPr>
+              <a:t>output_steps</a:t>
+            </a:r>
+            <a:r>
+              <a:rPr lang="en-US" sz="1400" dirty="0">
+                <a:solidFill>
+                  <a:srgbClr val="000000"/>
+                </a:solidFill>
+                <a:effectLst/>
+                <a:latin typeface="Menlo" panose="020B0609030804020204" pitchFamily="49" charset="0"/>
+              </a:rPr>
+              <a:t>: </a:t>
+            </a:r>
+            <a:r>
+              <a:rPr lang="en-US" sz="1400" dirty="0" err="1">
+                <a:solidFill>
+                  <a:srgbClr val="000000"/>
+                </a:solidFill>
+                <a:effectLst/>
+                <a:latin typeface="Menlo" panose="020B0609030804020204" pitchFamily="49" charset="0"/>
+              </a:rPr>
+              <a:t>steps_between_outputs</a:t>
+            </a:r>
+            <a:endParaRPr lang="en-US" sz="1400" dirty="0">
+              <a:solidFill>
+                <a:srgbClr val="000000"/>
+              </a:solidFill>
+              <a:effectLst/>
+              <a:latin typeface="Menlo" panose="020B0609030804020204" pitchFamily="49" charset="0"/>
+            </a:endParaRPr>
+          </a:p>
+          <a:p>
+            <a:r>
+              <a:rPr lang="en-US" sz="1400" dirty="0">
+                <a:solidFill>
+                  <a:srgbClr val="000000"/>
+                </a:solidFill>
+                <a:effectLst/>
+                <a:latin typeface="Menlo" panose="020B0609030804020204" pitchFamily="49" charset="0"/>
+              </a:rPr>
+              <a:t>      </a:t>
+            </a:r>
+            <a:r>
+              <a:rPr lang="en-US" sz="1400" dirty="0" err="1">
+                <a:solidFill>
+                  <a:srgbClr val="000000"/>
+                </a:solidFill>
+                <a:effectLst/>
+                <a:latin typeface="Menlo" panose="020B0609030804020204" pitchFamily="49" charset="0"/>
+              </a:rPr>
+              <a:t>graphic_steps</a:t>
+            </a:r>
+            <a:r>
+              <a:rPr lang="en-US" sz="1400" dirty="0">
+                <a:solidFill>
+                  <a:srgbClr val="000000"/>
+                </a:solidFill>
+                <a:effectLst/>
+                <a:latin typeface="Menlo" panose="020B0609030804020204" pitchFamily="49" charset="0"/>
+              </a:rPr>
+              <a:t>: </a:t>
+            </a:r>
+            <a:r>
+              <a:rPr lang="en-US" sz="1400" dirty="0" err="1">
+                <a:solidFill>
+                  <a:srgbClr val="000000"/>
+                </a:solidFill>
+                <a:effectLst/>
+                <a:latin typeface="Menlo" panose="020B0609030804020204" pitchFamily="49" charset="0"/>
+              </a:rPr>
+              <a:t>steps_between_graphics</a:t>
+            </a:r>
+            <a:endParaRPr lang="en-US" sz="1400" dirty="0">
+              <a:solidFill>
+                <a:srgbClr val="000000"/>
+              </a:solidFill>
+              <a:effectLst/>
+              <a:latin typeface="Menlo" panose="020B0609030804020204" pitchFamily="49" charset="0"/>
+            </a:endParaRPr>
+          </a:p>
+          <a:p>
+            <a:r>
+              <a:rPr lang="en-US" sz="1400" dirty="0">
+                <a:solidFill>
+                  <a:srgbClr val="000000"/>
+                </a:solidFill>
+                <a:effectLst/>
+                <a:latin typeface="Menlo" panose="020B0609030804020204" pitchFamily="49" charset="0"/>
+              </a:rPr>
+              <a:t>      </a:t>
+            </a:r>
+            <a:r>
+              <a:rPr lang="en-US" sz="1400" dirty="0" err="1">
+                <a:solidFill>
+                  <a:srgbClr val="000000"/>
+                </a:solidFill>
+                <a:effectLst/>
+                <a:latin typeface="Menlo" panose="020B0609030804020204" pitchFamily="49" charset="0"/>
+              </a:rPr>
+              <a:t>graphics_type</a:t>
+            </a:r>
+            <a:r>
+              <a:rPr lang="en-US" sz="1400" dirty="0">
+                <a:solidFill>
+                  <a:srgbClr val="000000"/>
+                </a:solidFill>
+                <a:effectLst/>
+                <a:latin typeface="Menlo" panose="020B0609030804020204" pitchFamily="49" charset="0"/>
+              </a:rPr>
+              <a:t>: </a:t>
+            </a:r>
+            <a:r>
+              <a:rPr lang="en-US" sz="1400" dirty="0" err="1">
+                <a:solidFill>
+                  <a:srgbClr val="000000"/>
+                </a:solidFill>
+                <a:effectLst/>
+                <a:latin typeface="Menlo" panose="020B0609030804020204" pitchFamily="49" charset="0"/>
+              </a:rPr>
+              <a:t>graphics_type</a:t>
+            </a:r>
+            <a:endParaRPr lang="en-US" sz="1400" dirty="0">
+              <a:solidFill>
+                <a:srgbClr val="000000"/>
+              </a:solidFill>
+              <a:effectLst/>
+              <a:latin typeface="Menlo" panose="020B0609030804020204" pitchFamily="49" charset="0"/>
+            </a:endParaRPr>
+          </a:p>
+          <a:p>
+            <a:r>
+              <a:rPr lang="en-US" sz="1400" dirty="0">
+                <a:solidFill>
+                  <a:srgbClr val="000000"/>
+                </a:solidFill>
+                <a:effectLst/>
+                <a:latin typeface="Menlo" panose="020B0609030804020204" pitchFamily="49" charset="0"/>
+              </a:rPr>
+              <a:t>    out: [</a:t>
+            </a:r>
+            <a:r>
+              <a:rPr lang="en-US" sz="1400" dirty="0" err="1">
+                <a:solidFill>
+                  <a:srgbClr val="000000"/>
+                </a:solidFill>
+                <a:effectLst/>
+                <a:latin typeface="Menlo" panose="020B0609030804020204" pitchFamily="49" charset="0"/>
+              </a:rPr>
+              <a:t>clamr_stdout</a:t>
+            </a:r>
+            <a:r>
+              <a:rPr lang="en-US" sz="1400" dirty="0">
+                <a:solidFill>
+                  <a:srgbClr val="000000"/>
+                </a:solidFill>
+                <a:effectLst/>
+                <a:latin typeface="Menlo" panose="020B0609030804020204" pitchFamily="49" charset="0"/>
+              </a:rPr>
+              <a:t>, </a:t>
+            </a:r>
+            <a:r>
+              <a:rPr lang="en-US" sz="1400" dirty="0" err="1">
+                <a:solidFill>
+                  <a:srgbClr val="000000"/>
+                </a:solidFill>
+                <a:effectLst/>
+                <a:latin typeface="Menlo" panose="020B0609030804020204" pitchFamily="49" charset="0"/>
+              </a:rPr>
+              <a:t>outdir</a:t>
+            </a:r>
+            <a:r>
+              <a:rPr lang="en-US" sz="1400" dirty="0">
+                <a:solidFill>
+                  <a:srgbClr val="000000"/>
+                </a:solidFill>
+                <a:effectLst/>
+                <a:latin typeface="Menlo" panose="020B0609030804020204" pitchFamily="49" charset="0"/>
+              </a:rPr>
+              <a:t>, </a:t>
+            </a:r>
+            <a:r>
+              <a:rPr lang="en-US" sz="1400" dirty="0" err="1">
+                <a:solidFill>
+                  <a:srgbClr val="000000"/>
+                </a:solidFill>
+                <a:effectLst/>
+                <a:latin typeface="Menlo" panose="020B0609030804020204" pitchFamily="49" charset="0"/>
+              </a:rPr>
+              <a:t>time_log</a:t>
+            </a:r>
+            <a:r>
+              <a:rPr lang="en-US" sz="1400" dirty="0">
+                <a:solidFill>
+                  <a:srgbClr val="000000"/>
+                </a:solidFill>
+                <a:effectLst/>
+                <a:latin typeface="Menlo" panose="020B0609030804020204" pitchFamily="49" charset="0"/>
+              </a:rPr>
+              <a:t>]</a:t>
+            </a:r>
+          </a:p>
+          <a:p>
+            <a:r>
+              <a:rPr lang="en-US" sz="1400" dirty="0">
+                <a:solidFill>
+                  <a:srgbClr val="000000"/>
+                </a:solidFill>
+                <a:effectLst/>
+                <a:latin typeface="Menlo" panose="020B0609030804020204" pitchFamily="49" charset="0"/>
+              </a:rPr>
+              <a:t>    hints:</a:t>
+            </a:r>
+          </a:p>
+          <a:p>
+            <a:r>
+              <a:rPr lang="en-US" sz="1400" dirty="0">
+                <a:solidFill>
+                  <a:srgbClr val="000000"/>
+                </a:solidFill>
+                <a:effectLst/>
+                <a:latin typeface="Menlo" panose="020B0609030804020204" pitchFamily="49" charset="0"/>
+              </a:rPr>
+              <a:t>        </a:t>
+            </a:r>
+            <a:r>
+              <a:rPr lang="en-US" sz="1400" dirty="0" err="1">
+                <a:solidFill>
+                  <a:srgbClr val="000000"/>
+                </a:solidFill>
+                <a:effectLst/>
+                <a:latin typeface="Menlo" panose="020B0609030804020204" pitchFamily="49" charset="0"/>
+              </a:rPr>
+              <a:t>DockerRequirement</a:t>
+            </a:r>
+            <a:r>
+              <a:rPr lang="en-US" sz="1400" dirty="0">
+                <a:solidFill>
+                  <a:srgbClr val="000000"/>
+                </a:solidFill>
+                <a:effectLst/>
+                <a:latin typeface="Menlo" panose="020B0609030804020204" pitchFamily="49" charset="0"/>
+              </a:rPr>
+              <a:t>:</a:t>
+            </a:r>
+          </a:p>
+          <a:p>
+            <a:r>
+              <a:rPr lang="en-US" sz="1400" dirty="0">
+                <a:solidFill>
+                  <a:srgbClr val="000000"/>
+                </a:solidFill>
+                <a:effectLst/>
+                <a:latin typeface="Menlo" panose="020B0609030804020204" pitchFamily="49" charset="0"/>
+              </a:rPr>
+              <a:t>            </a:t>
+            </a:r>
+            <a:r>
+              <a:rPr lang="en-US" sz="1400" dirty="0" err="1">
+                <a:solidFill>
+                  <a:srgbClr val="000000"/>
+                </a:solidFill>
+                <a:effectLst/>
+                <a:latin typeface="Menlo" panose="020B0609030804020204" pitchFamily="49" charset="0"/>
+              </a:rPr>
+              <a:t>dockerFile</a:t>
+            </a:r>
+            <a:r>
+              <a:rPr lang="en-US" sz="1400" dirty="0">
+                <a:solidFill>
+                  <a:srgbClr val="000000"/>
+                </a:solidFill>
+                <a:effectLst/>
+                <a:latin typeface="Menlo" panose="020B0609030804020204" pitchFamily="49" charset="0"/>
+              </a:rPr>
+              <a:t>: "</a:t>
+            </a:r>
+            <a:r>
+              <a:rPr lang="en-US" sz="1400" dirty="0" err="1">
+                <a:solidFill>
+                  <a:srgbClr val="000000"/>
+                </a:solidFill>
+                <a:effectLst/>
+                <a:latin typeface="Menlo" panose="020B0609030804020204" pitchFamily="49" charset="0"/>
+              </a:rPr>
+              <a:t>Dockerfile.clamr-ffmpeg</a:t>
+            </a:r>
+            <a:r>
+              <a:rPr lang="en-US" sz="1400" dirty="0">
+                <a:solidFill>
+                  <a:srgbClr val="000000"/>
+                </a:solidFill>
+                <a:effectLst/>
+                <a:latin typeface="Menlo" panose="020B0609030804020204" pitchFamily="49" charset="0"/>
+              </a:rPr>
+              <a:t>"</a:t>
+            </a:r>
+          </a:p>
+          <a:p>
+            <a:r>
+              <a:rPr lang="en-US" sz="1400" dirty="0">
+                <a:solidFill>
+                  <a:srgbClr val="000000"/>
+                </a:solidFill>
+                <a:effectLst/>
+                <a:latin typeface="Menlo" panose="020B0609030804020204" pitchFamily="49" charset="0"/>
+              </a:rPr>
+              <a:t>            </a:t>
+            </a:r>
+            <a:r>
+              <a:rPr lang="en-US" sz="1400" dirty="0" err="1">
+                <a:solidFill>
+                  <a:srgbClr val="000000"/>
+                </a:solidFill>
+                <a:effectLst/>
+                <a:latin typeface="Menlo" panose="020B0609030804020204" pitchFamily="49" charset="0"/>
+              </a:rPr>
+              <a:t>beeflow:containerName</a:t>
+            </a:r>
+            <a:r>
+              <a:rPr lang="en-US" sz="1400" dirty="0">
+                <a:solidFill>
+                  <a:srgbClr val="000000"/>
+                </a:solidFill>
+                <a:effectLst/>
+                <a:latin typeface="Menlo" panose="020B0609030804020204" pitchFamily="49" charset="0"/>
+              </a:rPr>
+              <a:t>: "</a:t>
+            </a:r>
+            <a:r>
+              <a:rPr lang="en-US" sz="1400" dirty="0" err="1">
+                <a:solidFill>
+                  <a:srgbClr val="000000"/>
+                </a:solidFill>
+                <a:effectLst/>
+                <a:latin typeface="Menlo" panose="020B0609030804020204" pitchFamily="49" charset="0"/>
+              </a:rPr>
+              <a:t>clamr-ffmpeg</a:t>
+            </a:r>
+            <a:r>
+              <a:rPr lang="en-US" sz="1400" dirty="0">
+                <a:solidFill>
+                  <a:srgbClr val="000000"/>
+                </a:solidFill>
+                <a:effectLst/>
+                <a:latin typeface="Menlo" panose="020B0609030804020204" pitchFamily="49" charset="0"/>
+              </a:rPr>
+              <a:t>"</a:t>
+            </a:r>
+          </a:p>
+          <a:p>
+            <a:endParaRPr lang="en-US" sz="1400" dirty="0">
+              <a:solidFill>
+                <a:srgbClr val="000000"/>
+              </a:solidFill>
+              <a:effectLst/>
+              <a:latin typeface="Menlo" panose="020B0609030804020204" pitchFamily="49" charset="0"/>
             </a:endParaRPr>
           </a:p>
         </p:txBody>

</xml_diff>